<commit_message>
caret tutorial: fixed typo, rev'd date.
</commit_message>
<xml_diff>
--- a/tutorials/modeling-and-caret-tutorial/ocrug_hackathon_modeling_tutorial.pptx
+++ b/tutorials/modeling-and-caret-tutorial/ocrug_hackathon_modeling_tutorial.pptx
@@ -843,8 +843,8 @@
         </p:nvSpPr>
         <p:spPr>
           <a:xfrm>
-            <a:off x="0" y="0"/>
-            <a:ext cx="13004800" cy="9753600"/>
+            <a:off x="-812800" y="0"/>
+            <a:ext cx="15232066" cy="10160000"/>
           </a:xfrm>
           <a:prstGeom prst="rect">
             <a:avLst/>
@@ -967,7 +967,7 @@
         <p:spPr>
           <a:xfrm>
             <a:off x="1606550" y="635000"/>
-            <a:ext cx="9779000" cy="5918200"/>
+            <a:ext cx="9779000" cy="6522729"/>
           </a:xfrm>
           <a:prstGeom prst="rect">
             <a:avLst/>
@@ -1237,13 +1237,13 @@
           <p:cNvPr id="38" name="Image"/>
           <p:cNvSpPr/>
           <p:nvPr>
-            <p:ph type="pic" sz="half" idx="13"/>
+            <p:ph type="pic" idx="13"/>
           </p:nvPr>
         </p:nvSpPr>
         <p:spPr>
           <a:xfrm>
-            <a:off x="6718300" y="635000"/>
-            <a:ext cx="5334000" cy="8229600"/>
+            <a:off x="2717800" y="635000"/>
+            <a:ext cx="12357100" cy="8238067"/>
           </a:xfrm>
           <a:prstGeom prst="rect">
             <a:avLst/>
@@ -1629,13 +1629,13 @@
           <p:cNvPr id="65" name="Image"/>
           <p:cNvSpPr/>
           <p:nvPr>
-            <p:ph type="pic" sz="half" idx="13"/>
+            <p:ph type="pic" idx="13"/>
           </p:nvPr>
         </p:nvSpPr>
         <p:spPr>
           <a:xfrm>
-            <a:off x="6718300" y="2603500"/>
-            <a:ext cx="5334000" cy="6286500"/>
+            <a:off x="4533900" y="2603500"/>
+            <a:ext cx="9429750" cy="6286500"/>
           </a:xfrm>
           <a:prstGeom prst="rect">
             <a:avLst/>
@@ -1916,8 +1916,8 @@
         </p:nvSpPr>
         <p:spPr>
           <a:xfrm>
-            <a:off x="6718300" y="5092700"/>
-            <a:ext cx="5334000" cy="3771900"/>
+            <a:off x="6680200" y="5026947"/>
+            <a:ext cx="6057901" cy="4040705"/>
           </a:xfrm>
           <a:prstGeom prst="rect">
             <a:avLst/>
@@ -1943,8 +1943,8 @@
         </p:nvSpPr>
         <p:spPr>
           <a:xfrm>
-            <a:off x="6724518" y="889000"/>
-            <a:ext cx="5334001" cy="3771900"/>
+            <a:off x="6502400" y="886747"/>
+            <a:ext cx="5867400" cy="3911601"/>
           </a:xfrm>
           <a:prstGeom prst="rect">
             <a:avLst/>
@@ -1965,13 +1965,13 @@
           <p:cNvPr id="85" name="Image"/>
           <p:cNvSpPr/>
           <p:nvPr>
-            <p:ph type="pic" sz="half" idx="15"/>
+            <p:ph type="pic" idx="15"/>
           </p:nvPr>
         </p:nvSpPr>
         <p:spPr>
           <a:xfrm>
-            <a:off x="952500" y="889000"/>
-            <a:ext cx="5334000" cy="7975600"/>
+            <a:off x="-2374900" y="889000"/>
+            <a:ext cx="11976100" cy="7984067"/>
           </a:xfrm>
           <a:prstGeom prst="rect">
             <a:avLst/>
@@ -2213,9 +2213,6 @@
         <a:buNone/>
         <a:tabLst/>
         <a:defRPr b="0" baseline="0" cap="none" i="0" spc="0" strike="noStrike" sz="8000" u="none">
-          <a:ln>
-            <a:noFill/>
-          </a:ln>
           <a:solidFill>
             <a:srgbClr val="000000"/>
           </a:solidFill>
@@ -2242,9 +2239,6 @@
         <a:buNone/>
         <a:tabLst/>
         <a:defRPr b="0" baseline="0" cap="none" i="0" spc="0" strike="noStrike" sz="8000" u="none">
-          <a:ln>
-            <a:noFill/>
-          </a:ln>
           <a:solidFill>
             <a:srgbClr val="000000"/>
           </a:solidFill>
@@ -2271,9 +2265,6 @@
         <a:buNone/>
         <a:tabLst/>
         <a:defRPr b="0" baseline="0" cap="none" i="0" spc="0" strike="noStrike" sz="8000" u="none">
-          <a:ln>
-            <a:noFill/>
-          </a:ln>
           <a:solidFill>
             <a:srgbClr val="000000"/>
           </a:solidFill>
@@ -2300,9 +2291,6 @@
         <a:buNone/>
         <a:tabLst/>
         <a:defRPr b="0" baseline="0" cap="none" i="0" spc="0" strike="noStrike" sz="8000" u="none">
-          <a:ln>
-            <a:noFill/>
-          </a:ln>
           <a:solidFill>
             <a:srgbClr val="000000"/>
           </a:solidFill>
@@ -2329,9 +2317,6 @@
         <a:buNone/>
         <a:tabLst/>
         <a:defRPr b="0" baseline="0" cap="none" i="0" spc="0" strike="noStrike" sz="8000" u="none">
-          <a:ln>
-            <a:noFill/>
-          </a:ln>
           <a:solidFill>
             <a:srgbClr val="000000"/>
           </a:solidFill>
@@ -2358,9 +2343,6 @@
         <a:buNone/>
         <a:tabLst/>
         <a:defRPr b="0" baseline="0" cap="none" i="0" spc="0" strike="noStrike" sz="8000" u="none">
-          <a:ln>
-            <a:noFill/>
-          </a:ln>
           <a:solidFill>
             <a:srgbClr val="000000"/>
           </a:solidFill>
@@ -2387,9 +2369,6 @@
         <a:buNone/>
         <a:tabLst/>
         <a:defRPr b="0" baseline="0" cap="none" i="0" spc="0" strike="noStrike" sz="8000" u="none">
-          <a:ln>
-            <a:noFill/>
-          </a:ln>
           <a:solidFill>
             <a:srgbClr val="000000"/>
           </a:solidFill>
@@ -2416,9 +2395,6 @@
         <a:buNone/>
         <a:tabLst/>
         <a:defRPr b="0" baseline="0" cap="none" i="0" spc="0" strike="noStrike" sz="8000" u="none">
-          <a:ln>
-            <a:noFill/>
-          </a:ln>
           <a:solidFill>
             <a:srgbClr val="000000"/>
           </a:solidFill>
@@ -2445,9 +2421,6 @@
         <a:buNone/>
         <a:tabLst/>
         <a:defRPr b="0" baseline="0" cap="none" i="0" spc="0" strike="noStrike" sz="8000" u="none">
-          <a:ln>
-            <a:noFill/>
-          </a:ln>
           <a:solidFill>
             <a:srgbClr val="000000"/>
           </a:solidFill>
@@ -2476,9 +2449,6 @@
         <a:buChar char="•"/>
         <a:tabLst/>
         <a:defRPr b="0" baseline="0" cap="none" i="0" spc="0" strike="noStrike" sz="3600" u="none">
-          <a:ln>
-            <a:noFill/>
-          </a:ln>
           <a:solidFill>
             <a:srgbClr val="000000"/>
           </a:solidFill>
@@ -2505,9 +2475,6 @@
         <a:buChar char="•"/>
         <a:tabLst/>
         <a:defRPr b="0" baseline="0" cap="none" i="0" spc="0" strike="noStrike" sz="3600" u="none">
-          <a:ln>
-            <a:noFill/>
-          </a:ln>
           <a:solidFill>
             <a:srgbClr val="000000"/>
           </a:solidFill>
@@ -2534,9 +2501,6 @@
         <a:buChar char="•"/>
         <a:tabLst/>
         <a:defRPr b="0" baseline="0" cap="none" i="0" spc="0" strike="noStrike" sz="3600" u="none">
-          <a:ln>
-            <a:noFill/>
-          </a:ln>
           <a:solidFill>
             <a:srgbClr val="000000"/>
           </a:solidFill>
@@ -2563,9 +2527,6 @@
         <a:buChar char="•"/>
         <a:tabLst/>
         <a:defRPr b="0" baseline="0" cap="none" i="0" spc="0" strike="noStrike" sz="3600" u="none">
-          <a:ln>
-            <a:noFill/>
-          </a:ln>
           <a:solidFill>
             <a:srgbClr val="000000"/>
           </a:solidFill>
@@ -2592,9 +2553,6 @@
         <a:buChar char="•"/>
         <a:tabLst/>
         <a:defRPr b="0" baseline="0" cap="none" i="0" spc="0" strike="noStrike" sz="3600" u="none">
-          <a:ln>
-            <a:noFill/>
-          </a:ln>
           <a:solidFill>
             <a:srgbClr val="000000"/>
           </a:solidFill>
@@ -2621,9 +2579,6 @@
         <a:buChar char="•"/>
         <a:tabLst/>
         <a:defRPr b="0" baseline="0" cap="none" i="0" spc="0" strike="noStrike" sz="3600" u="none">
-          <a:ln>
-            <a:noFill/>
-          </a:ln>
           <a:solidFill>
             <a:srgbClr val="000000"/>
           </a:solidFill>
@@ -2650,9 +2605,6 @@
         <a:buChar char="•"/>
         <a:tabLst/>
         <a:defRPr b="0" baseline="0" cap="none" i="0" spc="0" strike="noStrike" sz="3600" u="none">
-          <a:ln>
-            <a:noFill/>
-          </a:ln>
           <a:solidFill>
             <a:srgbClr val="000000"/>
           </a:solidFill>
@@ -2679,9 +2631,6 @@
         <a:buChar char="•"/>
         <a:tabLst/>
         <a:defRPr b="0" baseline="0" cap="none" i="0" spc="0" strike="noStrike" sz="3600" u="none">
-          <a:ln>
-            <a:noFill/>
-          </a:ln>
           <a:solidFill>
             <a:srgbClr val="000000"/>
           </a:solidFill>
@@ -2708,9 +2657,6 @@
         <a:buChar char="•"/>
         <a:tabLst/>
         <a:defRPr b="0" baseline="0" cap="none" i="0" spc="0" strike="noStrike" sz="3600" u="none">
-          <a:ln>
-            <a:noFill/>
-          </a:ln>
           <a:solidFill>
             <a:srgbClr val="000000"/>
           </a:solidFill>
@@ -2739,9 +2685,6 @@
         <a:buNone/>
         <a:tabLst/>
         <a:defRPr b="0" baseline="0" cap="none" i="0" spc="0" strike="noStrike" sz="1800" u="none">
-          <a:ln>
-            <a:noFill/>
-          </a:ln>
           <a:solidFill>
             <a:schemeClr val="tx1"/>
           </a:solidFill>
@@ -2768,9 +2711,6 @@
         <a:buNone/>
         <a:tabLst/>
         <a:defRPr b="0" baseline="0" cap="none" i="0" spc="0" strike="noStrike" sz="1800" u="none">
-          <a:ln>
-            <a:noFill/>
-          </a:ln>
           <a:solidFill>
             <a:schemeClr val="tx1"/>
           </a:solidFill>
@@ -2797,9 +2737,6 @@
         <a:buNone/>
         <a:tabLst/>
         <a:defRPr b="0" baseline="0" cap="none" i="0" spc="0" strike="noStrike" sz="1800" u="none">
-          <a:ln>
-            <a:noFill/>
-          </a:ln>
           <a:solidFill>
             <a:schemeClr val="tx1"/>
           </a:solidFill>
@@ -2826,9 +2763,6 @@
         <a:buNone/>
         <a:tabLst/>
         <a:defRPr b="0" baseline="0" cap="none" i="0" spc="0" strike="noStrike" sz="1800" u="none">
-          <a:ln>
-            <a:noFill/>
-          </a:ln>
           <a:solidFill>
             <a:schemeClr val="tx1"/>
           </a:solidFill>
@@ -2855,9 +2789,6 @@
         <a:buNone/>
         <a:tabLst/>
         <a:defRPr b="0" baseline="0" cap="none" i="0" spc="0" strike="noStrike" sz="1800" u="none">
-          <a:ln>
-            <a:noFill/>
-          </a:ln>
           <a:solidFill>
             <a:schemeClr val="tx1"/>
           </a:solidFill>
@@ -2884,9 +2815,6 @@
         <a:buNone/>
         <a:tabLst/>
         <a:defRPr b="0" baseline="0" cap="none" i="0" spc="0" strike="noStrike" sz="1800" u="none">
-          <a:ln>
-            <a:noFill/>
-          </a:ln>
           <a:solidFill>
             <a:schemeClr val="tx1"/>
           </a:solidFill>
@@ -2913,9 +2841,6 @@
         <a:buNone/>
         <a:tabLst/>
         <a:defRPr b="0" baseline="0" cap="none" i="0" spc="0" strike="noStrike" sz="1800" u="none">
-          <a:ln>
-            <a:noFill/>
-          </a:ln>
           <a:solidFill>
             <a:schemeClr val="tx1"/>
           </a:solidFill>
@@ -2942,9 +2867,6 @@
         <a:buNone/>
         <a:tabLst/>
         <a:defRPr b="0" baseline="0" cap="none" i="0" spc="0" strike="noStrike" sz="1800" u="none">
-          <a:ln>
-            <a:noFill/>
-          </a:ln>
           <a:solidFill>
             <a:schemeClr val="tx1"/>
           </a:solidFill>
@@ -2971,9 +2893,6 @@
         <a:buNone/>
         <a:tabLst/>
         <a:defRPr b="0" baseline="0" cap="none" i="0" spc="0" strike="noStrike" sz="1800" u="none">
-          <a:ln>
-            <a:noFill/>
-          </a:ln>
           <a:solidFill>
             <a:schemeClr val="tx1"/>
           </a:solidFill>
@@ -3036,7 +2955,7 @@
       </p:sp>
       <p:sp>
         <p:nvSpPr>
-          <p:cNvPr id="120" name="Ryan Benz • OCRUG Hackathon 2019 Tutorial May 18, 2019"/>
+          <p:cNvPr id="120" name="Ryan Benz • OCRUG Hackathon 2019 Tutorial November 9, 2019"/>
           <p:cNvSpPr txBox="1"/>
           <p:nvPr>
             <p:ph type="subTitle" sz="quarter" idx="1"/>
@@ -3061,7 +2980,7 @@
             </a:r>
             <a:br/>
             <a:r>
-              <a:t>May 18, 2019</a:t>
+              <a:t>November 9, 2019</a:t>
             </a:r>
           </a:p>
         </p:txBody>
@@ -4786,7 +4705,7 @@
         <p:spPr>
           <a:xfrm>
             <a:off x="654931" y="3421807"/>
-            <a:ext cx="9268198" cy="762001"/>
+            <a:ext cx="9095483" cy="762001"/>
           </a:xfrm>
           <a:prstGeom prst="rect">
             <a:avLst/>
@@ -6644,9 +6563,9 @@
       </p:par>
     </p:tnLst>
     <p:bldLst>
-      <p:bldP build="whole" bldLvl="1" animBg="1" rev="0" advAuto="0" spid="268" grpId="2"/>
       <p:bldP build="whole" bldLvl="1" animBg="1" rev="0" advAuto="0" spid="269" grpId="3"/>
       <p:bldP build="whole" bldLvl="1" animBg="1" rev="0" advAuto="0" spid="265" grpId="1"/>
+      <p:bldP build="whole" bldLvl="1" animBg="1" rev="0" advAuto="0" spid="268" grpId="2"/>
     </p:bldLst>
   </p:timing>
 </p:sld>
@@ -7000,7 +6919,7 @@
           <a:p>
             <a:pPr/>
             <a:r>
-              <a:t>Model performance on your training data is often over-optimistic, does represent how well the model will generalize to new data</a:t>
+              <a:t>Model performance on your training data is often over-optimistic, may not represent how well the model will generalize to new data</a:t>
             </a:r>
           </a:p>
           <a:p>
@@ -8440,7 +8359,7 @@
         <p:spPr>
           <a:xfrm>
             <a:off x="1411146" y="6361827"/>
-            <a:ext cx="8524951" cy="2235201"/>
+            <a:ext cx="8372030" cy="2235201"/>
           </a:xfrm>
           <a:prstGeom prst="rect">
             <a:avLst/>
@@ -9703,24 +9622,24 @@
         </p:nvGrpSpPr>
         <p:grpSpPr>
           <a:xfrm>
-            <a:off x="897086" y="5870822"/>
-            <a:ext cx="3135630" cy="2630652"/>
-            <a:chOff x="0" y="0"/>
-            <a:chExt cx="3135629" cy="2630651"/>
+            <a:off x="2464901" y="6156572"/>
+            <a:ext cx="1270001" cy="2579852"/>
+            <a:chOff x="1521917" y="285749"/>
+            <a:chExt cx="1270000" cy="2579851"/>
           </a:xfrm>
         </p:grpSpPr>
         <p:sp>
           <p:nvSpPr>
             <p:cNvPr id="130" name="Predictive modeling…"/>
-            <p:cNvSpPr txBox="1"/>
+            <p:cNvSpPr/>
             <p:nvPr/>
           </p:nvSpPr>
           <p:spPr>
             <a:xfrm>
-              <a:off x="-1" y="560551"/>
-              <a:ext cx="3135631" cy="2070101"/>
+              <a:off x="1521917" y="1595601"/>
+              <a:ext cx="1270001" cy="1270001"/>
             </a:xfrm>
-            <a:prstGeom prst="rect">
+            <a:prstGeom prst="line">
               <a:avLst/>
             </a:prstGeom>
             <a:noFill/>
@@ -9785,15 +9704,15 @@
         <p:sp>
           <p:nvSpPr>
             <p:cNvPr id="131" name="The Subject"/>
-            <p:cNvSpPr txBox="1"/>
+            <p:cNvSpPr/>
             <p:nvPr/>
           </p:nvSpPr>
           <p:spPr>
             <a:xfrm>
-              <a:off x="395021" y="0"/>
-              <a:ext cx="2345588" cy="571501"/>
+              <a:off x="1521917" y="285749"/>
+              <a:ext cx="1270001" cy="1270001"/>
             </a:xfrm>
-            <a:prstGeom prst="rect">
+            <a:prstGeom prst="line">
               <a:avLst/>
             </a:prstGeom>
             <a:noFill/>
@@ -9839,24 +9758,24 @@
         </p:nvGrpSpPr>
         <p:grpSpPr>
           <a:xfrm>
-            <a:off x="4401927" y="5870822"/>
-            <a:ext cx="3906432" cy="2694152"/>
-            <a:chOff x="0" y="0"/>
-            <a:chExt cx="3906430" cy="2694151"/>
+            <a:off x="6355143" y="6156572"/>
+            <a:ext cx="1270001" cy="2611602"/>
+            <a:chOff x="1905552" y="285749"/>
+            <a:chExt cx="1270000" cy="2611601"/>
           </a:xfrm>
         </p:grpSpPr>
         <p:sp>
           <p:nvSpPr>
             <p:cNvPr id="133" name="Features…"/>
-            <p:cNvSpPr txBox="1"/>
+            <p:cNvSpPr/>
             <p:nvPr/>
           </p:nvSpPr>
           <p:spPr>
             <a:xfrm>
-              <a:off x="0" y="560551"/>
-              <a:ext cx="3906432" cy="2133601"/>
+              <a:off x="1905552" y="1627351"/>
+              <a:ext cx="1270001" cy="1270001"/>
             </a:xfrm>
-            <a:prstGeom prst="rect">
+            <a:prstGeom prst="line">
               <a:avLst/>
             </a:prstGeom>
             <a:noFill/>
@@ -9921,15 +9840,15 @@
         <p:sp>
           <p:nvSpPr>
             <p:cNvPr id="134" name="The Data"/>
-            <p:cNvSpPr txBox="1"/>
+            <p:cNvSpPr/>
             <p:nvPr/>
           </p:nvSpPr>
           <p:spPr>
             <a:xfrm>
-              <a:off x="1010048" y="0"/>
-              <a:ext cx="1886335" cy="571501"/>
+              <a:off x="1905552" y="285749"/>
+              <a:ext cx="1270001" cy="1270001"/>
             </a:xfrm>
-            <a:prstGeom prst="rect">
+            <a:prstGeom prst="line">
               <a:avLst/>
             </a:prstGeom>
             <a:noFill/>
@@ -9975,24 +9894,24 @@
         </p:nvGrpSpPr>
         <p:grpSpPr>
           <a:xfrm>
-            <a:off x="8677571" y="5870822"/>
-            <a:ext cx="3430144" cy="2694152"/>
-            <a:chOff x="0" y="0"/>
-            <a:chExt cx="3430142" cy="2694151"/>
+            <a:off x="10392642" y="6156572"/>
+            <a:ext cx="1270001" cy="2611602"/>
+            <a:chOff x="1667408" y="285749"/>
+            <a:chExt cx="1270000" cy="2611601"/>
           </a:xfrm>
         </p:grpSpPr>
         <p:sp>
           <p:nvSpPr>
             <p:cNvPr id="136" name="The Outcomes"/>
-            <p:cNvSpPr txBox="1"/>
+            <p:cNvSpPr/>
             <p:nvPr/>
           </p:nvSpPr>
           <p:spPr>
             <a:xfrm>
-              <a:off x="290640" y="0"/>
-              <a:ext cx="2848863" cy="571501"/>
+              <a:off x="1667408" y="285749"/>
+              <a:ext cx="1270001" cy="1270001"/>
             </a:xfrm>
-            <a:prstGeom prst="rect">
+            <a:prstGeom prst="line">
               <a:avLst/>
             </a:prstGeom>
             <a:noFill/>
@@ -10032,15 +9951,15 @@
         <p:sp>
           <p:nvSpPr>
             <p:cNvPr id="137" name="Classes…"/>
-            <p:cNvSpPr txBox="1"/>
+            <p:cNvSpPr/>
             <p:nvPr/>
           </p:nvSpPr>
           <p:spPr>
             <a:xfrm>
-              <a:off x="-1" y="560551"/>
-              <a:ext cx="3430144" cy="2133601"/>
+              <a:off x="1667408" y="1627351"/>
+              <a:ext cx="1270001" cy="1270001"/>
             </a:xfrm>
-            <a:prstGeom prst="rect">
+            <a:prstGeom prst="line">
               <a:avLst/>
             </a:prstGeom>
             <a:noFill/>
@@ -13313,17 +13232,17 @@
       </p:par>
     </p:tnLst>
     <p:bldLst>
-      <p:bldP build="whole" bldLvl="1" animBg="1" rev="0" advAuto="0" spid="179" grpId="6"/>
-      <p:bldP build="whole" bldLvl="1" animBg="1" rev="0" advAuto="0" spid="176" grpId="4"/>
+      <p:bldP build="whole" bldLvl="1" animBg="1" rev="0" advAuto="0" spid="175" grpId="3"/>
       <p:bldP build="whole" bldLvl="1" animBg="1" rev="0" advAuto="0" spid="173" grpId="1"/>
-      <p:bldP build="whole" bldLvl="1" animBg="1" rev="0" advAuto="0" spid="180" grpId="5"/>
-      <p:bldP build="whole" bldLvl="1" animBg="1" rev="0" advAuto="0" spid="183" grpId="8"/>
-      <p:bldP build="whole" bldLvl="1" animBg="1" rev="0" advAuto="0" spid="188" grpId="9"/>
       <p:bldP build="whole" bldLvl="1" animBg="1" rev="0" advAuto="0" spid="201" grpId="7"/>
       <p:bldP build="whole" bldLvl="1" animBg="1" rev="0" advAuto="0" spid="191" grpId="10"/>
+      <p:bldP build="whole" bldLvl="1" animBg="1" rev="0" advAuto="0" spid="176" grpId="4"/>
       <p:bldP build="whole" bldLvl="1" animBg="1" rev="0" advAuto="0" spid="174" grpId="2"/>
+      <p:bldP build="whole" bldLvl="1" animBg="1" rev="0" advAuto="0" spid="180" grpId="5"/>
+      <p:bldP build="whole" bldLvl="1" animBg="1" rev="0" advAuto="0" spid="188" grpId="9"/>
+      <p:bldP build="whole" bldLvl="1" animBg="1" rev="0" advAuto="0" spid="179" grpId="6"/>
       <p:bldP build="whole" bldLvl="1" animBg="1" rev="0" advAuto="0" spid="194" grpId="11"/>
-      <p:bldP build="whole" bldLvl="1" animBg="1" rev="0" advAuto="0" spid="175" grpId="3"/>
+      <p:bldP build="whole" bldLvl="1" animBg="1" rev="0" advAuto="0" spid="183" grpId="8"/>
     </p:bldLst>
   </p:timing>
 </p:sld>

</xml_diff>